<commit_message>
Added changes to poster
</commit_message>
<xml_diff>
--- a/Documentation/Electronic_Caddy_Poster.pptx
+++ b/Documentation/Electronic_Caddy_Poster.pptx
@@ -223,7 +223,7 @@
             <a:fld id="{4E6FBB30-8580-4842-B7AE-628EE6A19D00}" type="datetimeFigureOut">
               <a:rPr lang="en-US" smtClean="0"/>
               <a:pPr/>
-              <a:t>4/8/2024</a:t>
+              <a:t>22-Apr-24</a:t>
             </a:fld>
             <a:endParaRPr lang="en-US"/>
           </a:p>
@@ -2022,7 +2022,7 @@
                   </a:schemeClr>
                 </a:solidFill>
               </a:rPr>
-              <a:t>The Electronic Caddy is a GPS based caddy built into a golf bag. This project aims to lower the golf score of the user. The project does this in several ways.</a:t>
+              <a:t>The Electronic Caddy is a GPS-based caddy built into a golf bag. This project aims to lower the golf score of the user. The project does this in several ways.</a:t>
             </a:r>
             <a:br>
               <a:rPr lang="en-US" sz="4000" dirty="0">
@@ -2277,9 +2277,6 @@
               </a:rPr>
               <a:t>Methods</a:t>
             </a:r>
-            <a:br>
-              <a:rPr lang="en-US" sz="8640" b="1" dirty="0"/>
-            </a:br>
             <a:endParaRPr lang="en-US" sz="8640" b="1" dirty="0"/>
           </a:p>
           <a:p>
@@ -2305,6 +2302,17 @@
               <a:buChar char="•"/>
               <a:defRPr/>
             </a:pPr>
+            <a:endParaRPr lang="en-US" sz="4000" dirty="0"/>
+          </a:p>
+          <a:p>
+            <a:pPr marL="1112520" indent="-1112520">
+              <a:buClr>
+                <a:schemeClr val="tx1"/>
+              </a:buClr>
+              <a:buFont typeface="Arial" pitchFamily="34" charset="0"/>
+              <a:buChar char="•"/>
+              <a:defRPr/>
+            </a:pPr>
             <a:r>
               <a:rPr lang="en-US" sz="4000" dirty="0"/>
               <a:t>NMEA GPS protocol produces within 2 yards of accuracy</a:t>
@@ -2319,6 +2327,17 @@
               <a:buChar char="•"/>
               <a:defRPr/>
             </a:pPr>
+            <a:endParaRPr lang="en-US" sz="4000" dirty="0"/>
+          </a:p>
+          <a:p>
+            <a:pPr marL="1112520" indent="-1112520">
+              <a:buClr>
+                <a:schemeClr val="tx1"/>
+              </a:buClr>
+              <a:buFont typeface="Arial" pitchFamily="34" charset="0"/>
+              <a:buChar char="•"/>
+              <a:defRPr/>
+            </a:pPr>
             <a:r>
               <a:rPr lang="en-US" sz="4000" dirty="0"/>
               <a:t>FLASH memory usage to store data between power cycles</a:t>
@@ -2333,6 +2352,17 @@
               <a:buChar char="•"/>
               <a:defRPr/>
             </a:pPr>
+            <a:endParaRPr lang="en-US" sz="4000" dirty="0"/>
+          </a:p>
+          <a:p>
+            <a:pPr marL="1112520" indent="-1112520">
+              <a:buClr>
+                <a:schemeClr val="tx1"/>
+              </a:buClr>
+              <a:buFont typeface="Arial" pitchFamily="34" charset="0"/>
+              <a:buChar char="•"/>
+              <a:defRPr/>
+            </a:pPr>
             <a:r>
               <a:rPr lang="en-US" sz="4000" dirty="0"/>
               <a:t>Liquid Crystal Display for informative feedback to the user</a:t>
@@ -2347,6 +2377,17 @@
               <a:buChar char="•"/>
               <a:defRPr/>
             </a:pPr>
+            <a:endParaRPr lang="en-US" sz="4000" dirty="0"/>
+          </a:p>
+          <a:p>
+            <a:pPr marL="1112520" indent="-1112520">
+              <a:buClr>
+                <a:schemeClr val="tx1"/>
+              </a:buClr>
+              <a:buFont typeface="Arial" pitchFamily="34" charset="0"/>
+              <a:buChar char="•"/>
+              <a:defRPr/>
+            </a:pPr>
             <a:r>
               <a:rPr lang="en-US" sz="4000" dirty="0"/>
               <a:t>Customizable preferences stored in FLASH memory</a:t>
@@ -2361,10 +2402,32 @@
               <a:buChar char="•"/>
               <a:defRPr/>
             </a:pPr>
+            <a:endParaRPr lang="en-US" sz="4000" dirty="0"/>
+          </a:p>
+          <a:p>
+            <a:pPr marL="1112520" indent="-1112520">
+              <a:buClr>
+                <a:schemeClr val="tx1"/>
+              </a:buClr>
+              <a:buFont typeface="Arial" pitchFamily="34" charset="0"/>
+              <a:buChar char="•"/>
+              <a:defRPr/>
+            </a:pPr>
             <a:r>
               <a:rPr lang="en-US" sz="4000" dirty="0"/>
               <a:t>Custom club yardages stored in FLASH memory</a:t>
             </a:r>
+          </a:p>
+          <a:p>
+            <a:pPr marL="1112520" indent="-1112520">
+              <a:buClr>
+                <a:schemeClr val="tx1"/>
+              </a:buClr>
+              <a:buFont typeface="Arial" pitchFamily="34" charset="0"/>
+              <a:buChar char="•"/>
+              <a:defRPr/>
+            </a:pPr>
+            <a:endParaRPr lang="en-US" sz="4000" dirty="0"/>
           </a:p>
           <a:p>
             <a:pPr marL="1112520" indent="-1112520">
@@ -3172,7 +3235,7 @@
         <p:spPr>
           <a:xfrm>
             <a:off x="1219200" y="9355015"/>
-            <a:ext cx="14160212" cy="3077766"/>
+            <a:ext cx="14160212" cy="4924425"/>
           </a:xfrm>
           <a:prstGeom prst="rect">
             <a:avLst/>
@@ -3213,6 +3276,23 @@
               <a:buChar char="•"/>
               <a:defRPr/>
             </a:pPr>
+            <a:endParaRPr lang="en-US" sz="4000" dirty="0">
+              <a:solidFill>
+                <a:schemeClr val="accent1">
+                  <a:lumMod val="50000"/>
+                </a:schemeClr>
+              </a:solidFill>
+            </a:endParaRPr>
+          </a:p>
+          <a:p>
+            <a:pPr marL="1112520" indent="-1112520">
+              <a:buClr>
+                <a:schemeClr val="tx1"/>
+              </a:buClr>
+              <a:buFont typeface="Arial" pitchFamily="34" charset="0"/>
+              <a:buChar char="•"/>
+              <a:defRPr/>
+            </a:pPr>
             <a:r>
               <a:rPr lang="en-US" sz="4000" dirty="0">
                 <a:solidFill>
@@ -3221,8 +3301,25 @@
                   </a:schemeClr>
                 </a:solidFill>
               </a:rPr>
-              <a:t>Implement User preferences</a:t>
-            </a:r>
+              <a:t>Implement user preferences</a:t>
+            </a:r>
+          </a:p>
+          <a:p>
+            <a:pPr marL="1112520" indent="-1112520">
+              <a:buClr>
+                <a:schemeClr val="tx1"/>
+              </a:buClr>
+              <a:buFont typeface="Arial" pitchFamily="34" charset="0"/>
+              <a:buChar char="•"/>
+              <a:defRPr/>
+            </a:pPr>
+            <a:endParaRPr lang="en-US" sz="4000" dirty="0">
+              <a:solidFill>
+                <a:schemeClr val="accent1">
+                  <a:lumMod val="50000"/>
+                </a:schemeClr>
+              </a:solidFill>
+            </a:endParaRPr>
           </a:p>
           <a:p>
             <a:pPr marL="1112520" indent="-1112520">
@@ -3243,6 +3340,23 @@
               </a:rPr>
               <a:t>Use accurate GPS locations to determine yardage</a:t>
             </a:r>
+          </a:p>
+          <a:p>
+            <a:pPr marL="1112520" indent="-1112520">
+              <a:buClr>
+                <a:schemeClr val="tx1"/>
+              </a:buClr>
+              <a:buFont typeface="Arial" pitchFamily="34" charset="0"/>
+              <a:buChar char="•"/>
+              <a:defRPr/>
+            </a:pPr>
+            <a:endParaRPr lang="en-US" sz="4000" dirty="0">
+              <a:solidFill>
+                <a:schemeClr val="accent1">
+                  <a:lumMod val="50000"/>
+                </a:schemeClr>
+              </a:solidFill>
+            </a:endParaRPr>
           </a:p>
           <a:p>
             <a:pPr marL="1112520" indent="-1112520">

</xml_diff>